<commit_message>
Day 8 with Questions added
</commit_message>
<xml_diff>
--- a/Day 8.pptx
+++ b/Day 8.pptx
@@ -16,21 +16,22 @@
     <p:sldId id="261" r:id="rId11"/>
     <p:sldId id="262" r:id="rId12"/>
     <p:sldId id="263" r:id="rId13"/>
+    <p:sldId id="264" r:id="rId14"/>
   </p:sldIdLst>
   <p:sldSz cy="5143500" cx="9144000"/>
   <p:notesSz cx="6858000" cy="9144000"/>
   <p:embeddedFontLst>
     <p:embeddedFont>
       <p:font typeface="PT Sans Narrow"/>
-      <p:regular r:id="rId14"/>
-      <p:bold r:id="rId15"/>
+      <p:regular r:id="rId15"/>
+      <p:bold r:id="rId16"/>
     </p:embeddedFont>
     <p:embeddedFont>
       <p:font typeface="Open Sans"/>
-      <p:regular r:id="rId16"/>
-      <p:bold r:id="rId17"/>
-      <p:italic r:id="rId18"/>
-      <p:boldItalic r:id="rId19"/>
+      <p:regular r:id="rId17"/>
+      <p:bold r:id="rId18"/>
+      <p:italic r:id="rId19"/>
+      <p:boldItalic r:id="rId20"/>
     </p:embeddedFont>
   </p:embeddedFontLst>
   <p:defaultTextStyle>
@@ -1580,6 +1581,105 @@
       <p:sp>
         <p:nvSpPr>
           <p:cNvPr id="107" name="Google Shape;107;g5b7f5e964f_0_119:notes"/>
+          <p:cNvSpPr txBox="1"/>
+          <p:nvPr>
+            <p:ph idx="1" type="body"/>
+          </p:nvPr>
+        </p:nvSpPr>
+        <p:spPr>
+          <a:xfrm>
+            <a:off x="685800" y="4343400"/>
+            <a:ext cx="5486400" cy="4114800"/>
+          </a:xfrm>
+          <a:prstGeom prst="rect">
+            <a:avLst/>
+          </a:prstGeom>
+        </p:spPr>
+        <p:txBody>
+          <a:bodyPr anchorCtr="0" anchor="t" bIns="91425" lIns="91425" spcFirstLastPara="1" rIns="91425" wrap="square" tIns="91425">
+            <a:noAutofit/>
+          </a:bodyPr>
+          <a:lstStyle/>
+          <a:p>
+            <a:pPr indent="0" lvl="0" marL="0" rtl="0" algn="l">
+              <a:spcBef>
+                <a:spcPts val="0"/>
+              </a:spcBef>
+              <a:spcAft>
+                <a:spcPts val="0"/>
+              </a:spcAft>
+              <a:buNone/>
+            </a:pPr>
+            <a:r>
+              <a:t/>
+            </a:r>
+            <a:endParaRPr/>
+          </a:p>
+        </p:txBody>
+      </p:sp>
+    </p:spTree>
+  </p:cSld>
+  <p:clrMapOvr>
+    <a:masterClrMapping/>
+  </p:clrMapOvr>
+</p:notes>
+</file>
+
+<file path=ppt/notesSlides/notesSlide9.xml><?xml version="1.0" encoding="utf-8"?>
+<p:notes xmlns:a="http://schemas.openxmlformats.org/drawingml/2006/main" xmlns:r="http://schemas.openxmlformats.org/officeDocument/2006/relationships" xmlns:mc="http://schemas.openxmlformats.org/markup-compatibility/2006" xmlns:mv="urn:schemas-microsoft-com:mac:vml" xmlns:p="http://schemas.openxmlformats.org/presentationml/2006/main" xmlns:c="http://schemas.openxmlformats.org/drawingml/2006/chart" xmlns:dgm="http://schemas.openxmlformats.org/drawingml/2006/diagram" xmlns:o="urn:schemas-microsoft-com:office:office" xmlns:v="urn:schemas-microsoft-com:vml" xmlns:pvml="urn:schemas-microsoft-com:office:powerpoint" xmlns:com="http://schemas.openxmlformats.org/drawingml/2006/compatibility" xmlns:p14="http://schemas.microsoft.com/office/powerpoint/2010/main" xmlns:p15="http://schemas.microsoft.com/office/powerpoint/2012/main" showMasterPhAnim="0" showMasterSp="0">
+  <p:cSld>
+    <p:spTree>
+      <p:nvGrpSpPr>
+        <p:cNvPr id="111" name="Shape 111"/>
+        <p:cNvGrpSpPr/>
+        <p:nvPr/>
+      </p:nvGrpSpPr>
+      <p:grpSpPr>
+        <a:xfrm>
+          <a:off x="0" y="0"/>
+          <a:ext cx="0" cy="0"/>
+          <a:chOff x="0" y="0"/>
+          <a:chExt cx="0" cy="0"/>
+        </a:xfrm>
+      </p:grpSpPr>
+      <p:sp>
+        <p:nvSpPr>
+          <p:cNvPr id="112" name="Google Shape;112;g5b81ba724a_0_0:notes"/>
+          <p:cNvSpPr/>
+          <p:nvPr>
+            <p:ph idx="2" type="sldImg"/>
+          </p:nvPr>
+        </p:nvSpPr>
+        <p:spPr>
+          <a:xfrm>
+            <a:off x="381300" y="685800"/>
+            <a:ext cx="6096000" cy="3429000"/>
+          </a:xfrm>
+          <a:custGeom>
+            <a:rect b="b" l="l" r="r" t="t"/>
+            <a:pathLst>
+              <a:path extrusionOk="0" h="120000" w="120000">
+                <a:moveTo>
+                  <a:pt x="0" y="0"/>
+                </a:moveTo>
+                <a:lnTo>
+                  <a:pt x="120000" y="0"/>
+                </a:lnTo>
+                <a:lnTo>
+                  <a:pt x="120000" y="120000"/>
+                </a:lnTo>
+                <a:lnTo>
+                  <a:pt x="0" y="120000"/>
+                </a:lnTo>
+                <a:close/>
+              </a:path>
+            </a:pathLst>
+          </a:custGeom>
+        </p:spPr>
+      </p:sp>
+      <p:sp>
+        <p:nvSpPr>
+          <p:cNvPr id="113" name="Google Shape;113;g5b81ba724a_0_0:notes"/>
           <p:cNvSpPr txBox="1"/>
           <p:nvPr>
             <p:ph idx="1" type="body"/>
@@ -10361,6 +10461,498 @@
 </p:sld>
 </file>
 
+<file path=ppt/slides/slide9.xml><?xml version="1.0" encoding="utf-8"?>
+<p:sld xmlns:a="http://schemas.openxmlformats.org/drawingml/2006/main" xmlns:r="http://schemas.openxmlformats.org/officeDocument/2006/relationships" xmlns:mc="http://schemas.openxmlformats.org/markup-compatibility/2006" xmlns:mv="urn:schemas-microsoft-com:mac:vml" xmlns:p="http://schemas.openxmlformats.org/presentationml/2006/main" xmlns:c="http://schemas.openxmlformats.org/drawingml/2006/chart" xmlns:dgm="http://schemas.openxmlformats.org/drawingml/2006/diagram" xmlns:o="urn:schemas-microsoft-com:office:office" xmlns:v="urn:schemas-microsoft-com:vml" xmlns:pvml="urn:schemas-microsoft-com:office:powerpoint" xmlns:com="http://schemas.openxmlformats.org/drawingml/2006/compatibility" xmlns:p14="http://schemas.microsoft.com/office/powerpoint/2010/main" xmlns:p15="http://schemas.microsoft.com/office/powerpoint/2012/main">
+  <p:cSld>
+    <p:spTree>
+      <p:nvGrpSpPr>
+        <p:cNvPr id="114" name="Shape 114"/>
+        <p:cNvGrpSpPr/>
+        <p:nvPr/>
+      </p:nvGrpSpPr>
+      <p:grpSpPr>
+        <a:xfrm>
+          <a:off x="0" y="0"/>
+          <a:ext cx="0" cy="0"/>
+          <a:chOff x="0" y="0"/>
+          <a:chExt cx="0" cy="0"/>
+        </a:xfrm>
+      </p:grpSpPr>
+      <p:sp>
+        <p:nvSpPr>
+          <p:cNvPr id="115" name="Google Shape;115;p21"/>
+          <p:cNvSpPr txBox="1"/>
+          <p:nvPr>
+            <p:ph type="title"/>
+          </p:nvPr>
+        </p:nvSpPr>
+        <p:spPr>
+          <a:xfrm>
+            <a:off x="311700" y="445025"/>
+            <a:ext cx="8520600" cy="707400"/>
+          </a:xfrm>
+          <a:prstGeom prst="rect">
+            <a:avLst/>
+          </a:prstGeom>
+        </p:spPr>
+        <p:txBody>
+          <a:bodyPr anchorCtr="0" anchor="t" bIns="91425" lIns="91425" spcFirstLastPara="1" rIns="91425" wrap="square" tIns="91425">
+            <a:noAutofit/>
+          </a:bodyPr>
+          <a:lstStyle/>
+          <a:p>
+            <a:pPr indent="0" lvl="0" marL="0" rtl="0" algn="l">
+              <a:spcBef>
+                <a:spcPts val="0"/>
+              </a:spcBef>
+              <a:spcAft>
+                <a:spcPts val="0"/>
+              </a:spcAft>
+              <a:buNone/>
+            </a:pPr>
+            <a:r>
+              <a:rPr lang="en"/>
+              <a:t>Questions</a:t>
+            </a:r>
+            <a:endParaRPr/>
+          </a:p>
+        </p:txBody>
+      </p:sp>
+      <p:sp>
+        <p:nvSpPr>
+          <p:cNvPr id="116" name="Google Shape;116;p21"/>
+          <p:cNvSpPr txBox="1"/>
+          <p:nvPr>
+            <p:ph idx="1" type="body"/>
+          </p:nvPr>
+        </p:nvSpPr>
+        <p:spPr>
+          <a:xfrm>
+            <a:off x="311700" y="1266325"/>
+            <a:ext cx="8520600" cy="3691200"/>
+          </a:xfrm>
+          <a:prstGeom prst="rect">
+            <a:avLst/>
+          </a:prstGeom>
+        </p:spPr>
+        <p:txBody>
+          <a:bodyPr anchorCtr="0" anchor="t" bIns="91425" lIns="91425" spcFirstLastPara="1" rIns="91425" wrap="square" tIns="91425">
+            <a:noAutofit/>
+          </a:bodyPr>
+          <a:lstStyle/>
+          <a:p>
+            <a:pPr indent="-317500" lvl="0" marL="457200" rtl="0" algn="l">
+              <a:spcBef>
+                <a:spcPts val="0"/>
+              </a:spcBef>
+              <a:spcAft>
+                <a:spcPts val="0"/>
+              </a:spcAft>
+              <a:buClr>
+                <a:srgbClr val="000000"/>
+              </a:buClr>
+              <a:buSzPts val="1400"/>
+              <a:buAutoNum type="arabicPeriod"/>
+            </a:pPr>
+            <a:r>
+              <a:rPr lang="en" sz="1400">
+                <a:solidFill>
+                  <a:srgbClr val="000000"/>
+                </a:solidFill>
+              </a:rPr>
+              <a:t>Write a function that takes an array of integers, and outputs a pointer that  points towards the maximum value in that array.</a:t>
+            </a:r>
+            <a:br>
+              <a:rPr lang="en" sz="1400">
+                <a:solidFill>
+                  <a:srgbClr val="000000"/>
+                </a:solidFill>
+              </a:rPr>
+            </a:br>
+            <a:r>
+              <a:rPr lang="en" sz="1400">
+                <a:solidFill>
+                  <a:srgbClr val="000000"/>
+                </a:solidFill>
+              </a:rPr>
+              <a:t>The function should be </a:t>
+            </a:r>
+            <a:r>
+              <a:rPr lang="en" sz="1400">
+                <a:solidFill>
+                  <a:srgbClr val="000000"/>
+                </a:solidFill>
+                <a:latin typeface="Courier New"/>
+                <a:ea typeface="Courier New"/>
+                <a:cs typeface="Courier New"/>
+                <a:sym typeface="Courier New"/>
+              </a:rPr>
+              <a:t>int* max_ptr(int*,int size);</a:t>
+            </a:r>
+            <a:br>
+              <a:rPr lang="en" sz="1400">
+                <a:solidFill>
+                  <a:srgbClr val="000000"/>
+                </a:solidFill>
+                <a:latin typeface="Courier New"/>
+                <a:ea typeface="Courier New"/>
+                <a:cs typeface="Courier New"/>
+                <a:sym typeface="Courier New"/>
+              </a:rPr>
+            </a:br>
+            <a:br>
+              <a:rPr lang="en" sz="1400">
+                <a:solidFill>
+                  <a:srgbClr val="000000"/>
+                </a:solidFill>
+                <a:latin typeface="Courier New"/>
+                <a:ea typeface="Courier New"/>
+                <a:cs typeface="Courier New"/>
+                <a:sym typeface="Courier New"/>
+              </a:rPr>
+            </a:br>
+            <a:endParaRPr sz="1400">
+              <a:solidFill>
+                <a:srgbClr val="000000"/>
+              </a:solidFill>
+              <a:latin typeface="Courier New"/>
+              <a:ea typeface="Courier New"/>
+              <a:cs typeface="Courier New"/>
+              <a:sym typeface="Courier New"/>
+            </a:endParaRPr>
+          </a:p>
+          <a:p>
+            <a:pPr indent="-317500" lvl="0" marL="457200" rtl="0" algn="l">
+              <a:spcBef>
+                <a:spcPts val="0"/>
+              </a:spcBef>
+              <a:spcAft>
+                <a:spcPts val="0"/>
+              </a:spcAft>
+              <a:buClr>
+                <a:srgbClr val="000000"/>
+              </a:buClr>
+              <a:buSzPts val="1400"/>
+              <a:buAutoNum type="arabicPeriod"/>
+            </a:pPr>
+            <a:r>
+              <a:rPr lang="en" sz="1400">
+                <a:solidFill>
+                  <a:srgbClr val="000000"/>
+                </a:solidFill>
+              </a:rPr>
+              <a:t>Write a function that adds two numbers using pointers. You are not allowed to return anything. The function declaration should look like:</a:t>
+            </a:r>
+            <a:r>
+              <a:rPr lang="en" sz="1400">
+                <a:solidFill>
+                  <a:srgbClr val="000000"/>
+                </a:solidFill>
+                <a:latin typeface="Courier New"/>
+                <a:ea typeface="Courier New"/>
+                <a:cs typeface="Courier New"/>
+                <a:sym typeface="Courier New"/>
+              </a:rPr>
+              <a:t> </a:t>
+            </a:r>
+            <a:br>
+              <a:rPr lang="en" sz="1400">
+                <a:solidFill>
+                  <a:srgbClr val="000000"/>
+                </a:solidFill>
+                <a:latin typeface="Courier New"/>
+                <a:ea typeface="Courier New"/>
+                <a:cs typeface="Courier New"/>
+                <a:sym typeface="Courier New"/>
+              </a:rPr>
+            </a:br>
+            <a:r>
+              <a:rPr lang="en" sz="1400">
+                <a:solidFill>
+                  <a:srgbClr val="000000"/>
+                </a:solidFill>
+                <a:latin typeface="Courier New"/>
+                <a:ea typeface="Courier New"/>
+                <a:cs typeface="Courier New"/>
+                <a:sym typeface="Courier New"/>
+              </a:rPr>
+              <a:t>void add(int* sum, int* a, int* b);</a:t>
+            </a:r>
+            <a:br>
+              <a:rPr lang="en" sz="1400">
+                <a:solidFill>
+                  <a:srgbClr val="000000"/>
+                </a:solidFill>
+                <a:latin typeface="Courier New"/>
+                <a:ea typeface="Courier New"/>
+                <a:cs typeface="Courier New"/>
+                <a:sym typeface="Courier New"/>
+              </a:rPr>
+            </a:br>
+            <a:r>
+              <a:rPr lang="en" sz="1400">
+                <a:solidFill>
+                  <a:srgbClr val="0000FF"/>
+                </a:solidFill>
+                <a:latin typeface="Courier New"/>
+                <a:ea typeface="Courier New"/>
+                <a:cs typeface="Courier New"/>
+                <a:sym typeface="Courier New"/>
+              </a:rPr>
+              <a:t>int</a:t>
+            </a:r>
+            <a:r>
+              <a:rPr lang="en" sz="1400">
+                <a:solidFill>
+                  <a:srgbClr val="000000"/>
+                </a:solidFill>
+                <a:latin typeface="Courier New"/>
+                <a:ea typeface="Courier New"/>
+                <a:cs typeface="Courier New"/>
+                <a:sym typeface="Courier New"/>
+              </a:rPr>
+              <a:t> main()</a:t>
+            </a:r>
+            <a:br>
+              <a:rPr lang="en" sz="1400">
+                <a:solidFill>
+                  <a:srgbClr val="000000"/>
+                </a:solidFill>
+                <a:latin typeface="Courier New"/>
+                <a:ea typeface="Courier New"/>
+                <a:cs typeface="Courier New"/>
+                <a:sym typeface="Courier New"/>
+              </a:rPr>
+            </a:br>
+            <a:r>
+              <a:rPr lang="en" sz="1400">
+                <a:solidFill>
+                  <a:srgbClr val="000000"/>
+                </a:solidFill>
+                <a:latin typeface="Courier New"/>
+                <a:ea typeface="Courier New"/>
+                <a:cs typeface="Courier New"/>
+                <a:sym typeface="Courier New"/>
+              </a:rPr>
+              <a:t>{</a:t>
+            </a:r>
+            <a:br>
+              <a:rPr lang="en" sz="1400">
+                <a:solidFill>
+                  <a:srgbClr val="000000"/>
+                </a:solidFill>
+                <a:latin typeface="Courier New"/>
+                <a:ea typeface="Courier New"/>
+                <a:cs typeface="Courier New"/>
+                <a:sym typeface="Courier New"/>
+              </a:rPr>
+            </a:br>
+            <a:r>
+              <a:rPr lang="en" sz="1400">
+                <a:solidFill>
+                  <a:srgbClr val="000000"/>
+                </a:solidFill>
+                <a:latin typeface="Courier New"/>
+                <a:ea typeface="Courier New"/>
+                <a:cs typeface="Courier New"/>
+                <a:sym typeface="Courier New"/>
+              </a:rPr>
+              <a:t>	</a:t>
+            </a:r>
+            <a:r>
+              <a:rPr lang="en" sz="1400">
+                <a:solidFill>
+                  <a:srgbClr val="0000FF"/>
+                </a:solidFill>
+                <a:latin typeface="Courier New"/>
+                <a:ea typeface="Courier New"/>
+                <a:cs typeface="Courier New"/>
+                <a:sym typeface="Courier New"/>
+              </a:rPr>
+              <a:t>int</a:t>
+            </a:r>
+            <a:r>
+              <a:rPr lang="en" sz="1400">
+                <a:solidFill>
+                  <a:srgbClr val="000000"/>
+                </a:solidFill>
+                <a:latin typeface="Courier New"/>
+                <a:ea typeface="Courier New"/>
+                <a:cs typeface="Courier New"/>
+                <a:sym typeface="Courier New"/>
+              </a:rPr>
+              <a:t> sum = 0, a = 2, b = 5;</a:t>
+            </a:r>
+            <a:br>
+              <a:rPr lang="en" sz="1400">
+                <a:solidFill>
+                  <a:srgbClr val="000000"/>
+                </a:solidFill>
+                <a:latin typeface="Courier New"/>
+                <a:ea typeface="Courier New"/>
+                <a:cs typeface="Courier New"/>
+                <a:sym typeface="Courier New"/>
+              </a:rPr>
+            </a:br>
+            <a:r>
+              <a:rPr lang="en" sz="1400">
+                <a:solidFill>
+                  <a:srgbClr val="000000"/>
+                </a:solidFill>
+                <a:latin typeface="Courier New"/>
+                <a:ea typeface="Courier New"/>
+                <a:cs typeface="Courier New"/>
+                <a:sym typeface="Courier New"/>
+              </a:rPr>
+              <a:t>	</a:t>
+            </a:r>
+            <a:r>
+              <a:rPr lang="en" sz="1400">
+                <a:solidFill>
+                  <a:srgbClr val="666666"/>
+                </a:solidFill>
+                <a:latin typeface="Courier New"/>
+                <a:ea typeface="Courier New"/>
+                <a:cs typeface="Courier New"/>
+                <a:sym typeface="Courier New"/>
+              </a:rPr>
+              <a:t>//call function add(int*,int*,int*) here</a:t>
+            </a:r>
+            <a:br>
+              <a:rPr lang="en" sz="1400">
+                <a:solidFill>
+                  <a:srgbClr val="000000"/>
+                </a:solidFill>
+                <a:latin typeface="Courier New"/>
+                <a:ea typeface="Courier New"/>
+                <a:cs typeface="Courier New"/>
+                <a:sym typeface="Courier New"/>
+              </a:rPr>
+            </a:br>
+            <a:r>
+              <a:rPr lang="en" sz="1400">
+                <a:solidFill>
+                  <a:srgbClr val="000000"/>
+                </a:solidFill>
+                <a:latin typeface="Courier New"/>
+                <a:ea typeface="Courier New"/>
+                <a:cs typeface="Courier New"/>
+                <a:sym typeface="Courier New"/>
+              </a:rPr>
+              <a:t>	</a:t>
+            </a:r>
+            <a:r>
+              <a:rPr lang="en" sz="1400">
+                <a:solidFill>
+                  <a:srgbClr val="38761D"/>
+                </a:solidFill>
+                <a:latin typeface="Courier New"/>
+                <a:ea typeface="Courier New"/>
+                <a:cs typeface="Courier New"/>
+                <a:sym typeface="Courier New"/>
+              </a:rPr>
+              <a:t>std::cout</a:t>
+            </a:r>
+            <a:r>
+              <a:rPr lang="en" sz="1400">
+                <a:solidFill>
+                  <a:srgbClr val="000000"/>
+                </a:solidFill>
+                <a:latin typeface="Courier New"/>
+                <a:ea typeface="Courier New"/>
+                <a:cs typeface="Courier New"/>
+                <a:sym typeface="Courier New"/>
+              </a:rPr>
+              <a:t> &lt;&lt; sum &lt;&lt; </a:t>
+            </a:r>
+            <a:r>
+              <a:rPr lang="en" sz="1400">
+                <a:solidFill>
+                  <a:srgbClr val="38761D"/>
+                </a:solidFill>
+                <a:latin typeface="Courier New"/>
+                <a:ea typeface="Courier New"/>
+                <a:cs typeface="Courier New"/>
+                <a:sym typeface="Courier New"/>
+              </a:rPr>
+              <a:t>std::endl</a:t>
+            </a:r>
+            <a:r>
+              <a:rPr lang="en" sz="1400">
+                <a:solidFill>
+                  <a:srgbClr val="000000"/>
+                </a:solidFill>
+                <a:latin typeface="Courier New"/>
+                <a:ea typeface="Courier New"/>
+                <a:cs typeface="Courier New"/>
+                <a:sym typeface="Courier New"/>
+              </a:rPr>
+              <a:t>; </a:t>
+            </a:r>
+            <a:r>
+              <a:rPr lang="en" sz="1400">
+                <a:solidFill>
+                  <a:srgbClr val="666666"/>
+                </a:solidFill>
+                <a:latin typeface="Courier New"/>
+                <a:ea typeface="Courier New"/>
+                <a:cs typeface="Courier New"/>
+                <a:sym typeface="Courier New"/>
+              </a:rPr>
+              <a:t>//should output 7</a:t>
+            </a:r>
+            <a:endParaRPr sz="1400">
+              <a:solidFill>
+                <a:srgbClr val="666666"/>
+              </a:solidFill>
+              <a:latin typeface="Courier New"/>
+              <a:ea typeface="Courier New"/>
+              <a:cs typeface="Courier New"/>
+              <a:sym typeface="Courier New"/>
+            </a:endParaRPr>
+          </a:p>
+          <a:p>
+            <a:pPr indent="0" lvl="0" marL="457200" rtl="0" algn="l">
+              <a:spcBef>
+                <a:spcPts val="1600"/>
+              </a:spcBef>
+              <a:spcAft>
+                <a:spcPts val="1600"/>
+              </a:spcAft>
+              <a:buNone/>
+            </a:pPr>
+            <a:r>
+              <a:rPr lang="en" sz="1400">
+                <a:solidFill>
+                  <a:srgbClr val="000000"/>
+                </a:solidFill>
+                <a:latin typeface="Courier New"/>
+                <a:ea typeface="Courier New"/>
+                <a:cs typeface="Courier New"/>
+                <a:sym typeface="Courier New"/>
+              </a:rPr>
+              <a:t>}</a:t>
+            </a:r>
+            <a:endParaRPr sz="1400">
+              <a:solidFill>
+                <a:srgbClr val="000000"/>
+              </a:solidFill>
+              <a:latin typeface="Courier New"/>
+              <a:ea typeface="Courier New"/>
+              <a:cs typeface="Courier New"/>
+              <a:sym typeface="Courier New"/>
+            </a:endParaRPr>
+          </a:p>
+        </p:txBody>
+      </p:sp>
+    </p:spTree>
+  </p:cSld>
+  <p:clrMapOvr>
+    <a:masterClrMapping/>
+  </p:clrMapOvr>
+</p:sld>
+</file>
+
 <file path=ppt/theme/theme1.xml><?xml version="1.0" encoding="utf-8"?>
 <a:theme xmlns:a="http://schemas.openxmlformats.org/drawingml/2006/main" xmlns:r="http://schemas.openxmlformats.org/officeDocument/2006/relationships">
   <a:themeElements>

</xml_diff>